<commit_message>
One minor file change
</commit_message>
<xml_diff>
--- a/Presentation/DDSAnalytics_CaseStudy2_Updated.pptx
+++ b/Presentation/DDSAnalytics_CaseStudy2_Updated.pptx
@@ -131,7 +131,7 @@
   </p:defaultTextStyle>
   <p:extLst>
     <p:ext uri="{EFAFB233-063F-42B5-8137-9DF3F51BA10A}">
-      <p15:sldGuideLst xmlns:p15="http://schemas.microsoft.com/office/powerpoint/2012/main">
+      <p15:sldGuideLst xmlns:p15="http://schemas.microsoft.com/office/powerpoint/2012/main" xmlns="">
         <p15:guide id="1" orient="horz" pos="2160">
           <p15:clr>
             <a:srgbClr val="A4A3A4"/>
@@ -230,7 +230,7 @@
           <a:p>
             <a:fld id="{167F8F20-95EB-1242-A2F1-50B4053D034F}" type="datetimeFigureOut">
               <a:rPr lang="en-US" smtClean="0"/>
-              <a:t>4/13/2019</a:t>
+              <a:t>4/16/19</a:t>
             </a:fld>
             <a:endParaRPr lang="en-US"/>
           </a:p>
@@ -2715,7 +2715,7 @@
             <a:fld id="{53074F12-AA26-4AC8-9962-C36BB8F32554}" type="datetimeFigureOut">
               <a:rPr lang="en-US" smtClean="0"/>
               <a:pPr/>
-              <a:t>4/13/2019</a:t>
+              <a:t>4/16/19</a:t>
             </a:fld>
             <a:endParaRPr lang="en-US"/>
           </a:p>
@@ -2969,7 +2969,7 @@
             <a:fld id="{53074F12-AA26-4AC8-9962-C36BB8F32554}" type="datetimeFigureOut">
               <a:rPr lang="en-US" smtClean="0"/>
               <a:pPr/>
-              <a:t>4/13/2019</a:t>
+              <a:t>4/16/19</a:t>
             </a:fld>
             <a:endParaRPr lang="en-US"/>
           </a:p>
@@ -3139,7 +3139,7 @@
             <a:fld id="{53074F12-AA26-4AC8-9962-C36BB8F32554}" type="datetimeFigureOut">
               <a:rPr lang="en-US" smtClean="0"/>
               <a:pPr/>
-              <a:t>4/13/2019</a:t>
+              <a:t>4/16/19</a:t>
             </a:fld>
             <a:endParaRPr lang="en-US"/>
           </a:p>
@@ -3319,7 +3319,7 @@
             <a:fld id="{53074F12-AA26-4AC8-9962-C36BB8F32554}" type="datetimeFigureOut">
               <a:rPr lang="en-US" smtClean="0"/>
               <a:pPr/>
-              <a:t>4/13/2019</a:t>
+              <a:t>4/16/19</a:t>
             </a:fld>
             <a:endParaRPr lang="en-US"/>
           </a:p>
@@ -3547,7 +3547,7 @@
             <a:fld id="{53074F12-AA26-4AC8-9962-C36BB8F32554}" type="datetimeFigureOut">
               <a:rPr lang="en-US" smtClean="0"/>
               <a:pPr/>
-              <a:t>4/13/2019</a:t>
+              <a:t>4/16/19</a:t>
             </a:fld>
             <a:endParaRPr lang="en-US"/>
           </a:p>
@@ -3783,7 +3783,7 @@
             <a:fld id="{53074F12-AA26-4AC8-9962-C36BB8F32554}" type="datetimeFigureOut">
               <a:rPr lang="en-US" smtClean="0"/>
               <a:pPr/>
-              <a:t>4/13/2019</a:t>
+              <a:t>4/16/19</a:t>
             </a:fld>
             <a:endParaRPr lang="en-US"/>
           </a:p>
@@ -4030,7 +4030,7 @@
             <a:fld id="{53074F12-AA26-4AC8-9962-C36BB8F32554}" type="datetimeFigureOut">
               <a:rPr lang="en-US" smtClean="0"/>
               <a:pPr/>
-              <a:t>4/13/2019</a:t>
+              <a:t>4/16/19</a:t>
             </a:fld>
             <a:endParaRPr lang="en-US"/>
           </a:p>
@@ -4317,7 +4317,7 @@
             <a:fld id="{53074F12-AA26-4AC8-9962-C36BB8F32554}" type="datetimeFigureOut">
               <a:rPr lang="en-US" smtClean="0"/>
               <a:pPr/>
-              <a:t>4/13/2019</a:t>
+              <a:t>4/16/19</a:t>
             </a:fld>
             <a:endParaRPr lang="en-US"/>
           </a:p>
@@ -4819,7 +4819,7 @@
             <a:fld id="{53074F12-AA26-4AC8-9962-C36BB8F32554}" type="datetimeFigureOut">
               <a:rPr lang="en-US" smtClean="0"/>
               <a:pPr/>
-              <a:t>4/13/2019</a:t>
+              <a:t>4/16/19</a:t>
             </a:fld>
             <a:endParaRPr lang="en-US"/>
           </a:p>
@@ -4938,7 +4938,7 @@
             <a:fld id="{53074F12-AA26-4AC8-9962-C36BB8F32554}" type="datetimeFigureOut">
               <a:rPr lang="en-US" smtClean="0"/>
               <a:pPr/>
-              <a:t>4/13/2019</a:t>
+              <a:t>4/16/19</a:t>
             </a:fld>
             <a:endParaRPr lang="en-US"/>
           </a:p>
@@ -5035,7 +5035,7 @@
             <a:fld id="{53074F12-AA26-4AC8-9962-C36BB8F32554}" type="datetimeFigureOut">
               <a:rPr lang="en-US" smtClean="0"/>
               <a:pPr/>
-              <a:t>4/13/2019</a:t>
+              <a:t>4/16/19</a:t>
             </a:fld>
             <a:endParaRPr lang="en-US"/>
           </a:p>
@@ -5312,7 +5312,7 @@
             <a:fld id="{53074F12-AA26-4AC8-9962-C36BB8F32554}" type="datetimeFigureOut">
               <a:rPr lang="en-US" smtClean="0"/>
               <a:pPr/>
-              <a:t>4/13/2019</a:t>
+              <a:t>4/16/19</a:t>
             </a:fld>
             <a:endParaRPr lang="en-US"/>
           </a:p>
@@ -5534,7 +5534,7 @@
             <a:fld id="{53074F12-AA26-4AC8-9962-C36BB8F32554}" type="datetimeFigureOut">
               <a:rPr lang="en-US" smtClean="0"/>
               <a:pPr/>
-              <a:t>4/13/2019</a:t>
+              <a:t>4/16/19</a:t>
             </a:fld>
             <a:endParaRPr lang="en-US"/>
           </a:p>
@@ -5946,6 +5946,10 @@
               <a:rPr lang="en-US" sz="5300" dirty="0" err="1"/>
               <a:t>DDSAnalitics</a:t>
             </a:r>
+            <a:r>
+              <a:rPr lang="en-US" sz="5300" dirty="0"/>
+              <a:t/>
+            </a:r>
             <a:br>
               <a:rPr lang="en-US" sz="5300" dirty="0"/>
             </a:br>
@@ -6070,7 +6074,7 @@
           <p:cNvPr id="2" name="Content Placeholder 1">
             <a:extLst>
               <a:ext uri="{FF2B5EF4-FFF2-40B4-BE49-F238E27FC236}">
-                <a16:creationId xmlns:a16="http://schemas.microsoft.com/office/drawing/2014/main" id="{45C2E727-516C-4A9F-A383-9EA361F13CE4}"/>
+                <a16:creationId xmlns:a16="http://schemas.microsoft.com/office/drawing/2014/main" xmlns="" id="{45C2E727-516C-4A9F-A383-9EA361F13CE4}"/>
               </a:ext>
             </a:extLst>
           </p:cNvPr>
@@ -6296,7 +6300,7 @@
           <p:cNvPr id="8" name="Picture 7">
             <a:extLst>
               <a:ext uri="{FF2B5EF4-FFF2-40B4-BE49-F238E27FC236}">
-                <a16:creationId xmlns:a16="http://schemas.microsoft.com/office/drawing/2014/main" id="{DB2C3199-C409-464D-B38D-D9D6AE877970}"/>
+                <a16:creationId xmlns:a16="http://schemas.microsoft.com/office/drawing/2014/main" xmlns="" id="{DB2C3199-C409-464D-B38D-D9D6AE877970}"/>
               </a:ext>
             </a:extLst>
           </p:cNvPr>
@@ -6342,7 +6346,7 @@
           <p:cNvPr id="15" name="Picture 14">
             <a:extLst>
               <a:ext uri="{FF2B5EF4-FFF2-40B4-BE49-F238E27FC236}">
-                <a16:creationId xmlns:a16="http://schemas.microsoft.com/office/drawing/2014/main" id="{FA7EBE22-8578-472B-8A15-1D66317CA7EB}"/>
+                <a16:creationId xmlns:a16="http://schemas.microsoft.com/office/drawing/2014/main" xmlns="" id="{FA7EBE22-8578-472B-8A15-1D66317CA7EB}"/>
               </a:ext>
             </a:extLst>
           </p:cNvPr>
@@ -6456,7 +6460,7 @@
           <p:cNvPr id="3" name="Picture 2">
             <a:extLst>
               <a:ext uri="{FF2B5EF4-FFF2-40B4-BE49-F238E27FC236}">
-                <a16:creationId xmlns:a16="http://schemas.microsoft.com/office/drawing/2014/main" id="{58CB6DB6-4899-433C-9588-E105827CCFD2}"/>
+                <a16:creationId xmlns:a16="http://schemas.microsoft.com/office/drawing/2014/main" xmlns="" id="{58CB6DB6-4899-433C-9588-E105827CCFD2}"/>
               </a:ext>
             </a:extLst>
           </p:cNvPr>
@@ -6502,7 +6506,7 @@
           <p:cNvPr id="7" name="Picture 6">
             <a:extLst>
               <a:ext uri="{FF2B5EF4-FFF2-40B4-BE49-F238E27FC236}">
-                <a16:creationId xmlns:a16="http://schemas.microsoft.com/office/drawing/2014/main" id="{4020E95C-9F46-4C7B-8360-ECDABE602960}"/>
+                <a16:creationId xmlns:a16="http://schemas.microsoft.com/office/drawing/2014/main" xmlns="" id="{4020E95C-9F46-4C7B-8360-ECDABE602960}"/>
               </a:ext>
             </a:extLst>
           </p:cNvPr>
@@ -6616,7 +6620,7 @@
           <p:cNvPr id="5" name="Picture 4">
             <a:extLst>
               <a:ext uri="{FF2B5EF4-FFF2-40B4-BE49-F238E27FC236}">
-                <a16:creationId xmlns:a16="http://schemas.microsoft.com/office/drawing/2014/main" id="{1F7771D5-DD24-47CC-8EA2-6FFF445661B9}"/>
+                <a16:creationId xmlns:a16="http://schemas.microsoft.com/office/drawing/2014/main" xmlns="" id="{1F7771D5-DD24-47CC-8EA2-6FFF445661B9}"/>
               </a:ext>
             </a:extLst>
           </p:cNvPr>
@@ -6662,7 +6666,7 @@
           <p:cNvPr id="8" name="Picture 7">
             <a:extLst>
               <a:ext uri="{FF2B5EF4-FFF2-40B4-BE49-F238E27FC236}">
-                <a16:creationId xmlns:a16="http://schemas.microsoft.com/office/drawing/2014/main" id="{E10743F2-03B0-4ACF-9B29-2AD23530A025}"/>
+                <a16:creationId xmlns:a16="http://schemas.microsoft.com/office/drawing/2014/main" xmlns="" id="{E10743F2-03B0-4ACF-9B29-2AD23530A025}"/>
               </a:ext>
             </a:extLst>
           </p:cNvPr>
@@ -6776,7 +6780,7 @@
           <p:cNvPr id="3" name="Picture 2">
             <a:extLst>
               <a:ext uri="{FF2B5EF4-FFF2-40B4-BE49-F238E27FC236}">
-                <a16:creationId xmlns:a16="http://schemas.microsoft.com/office/drawing/2014/main" id="{60D93743-C519-4097-A066-530F9F9176A3}"/>
+                <a16:creationId xmlns:a16="http://schemas.microsoft.com/office/drawing/2014/main" xmlns="" id="{60D93743-C519-4097-A066-530F9F9176A3}"/>
               </a:ext>
             </a:extLst>
           </p:cNvPr>
@@ -6890,7 +6894,7 @@
           <p:cNvPr id="5" name="Picture 4">
             <a:extLst>
               <a:ext uri="{FF2B5EF4-FFF2-40B4-BE49-F238E27FC236}">
-                <a16:creationId xmlns:a16="http://schemas.microsoft.com/office/drawing/2014/main" id="{89BB4C68-10AA-462C-88D1-E13850378523}"/>
+                <a16:creationId xmlns:a16="http://schemas.microsoft.com/office/drawing/2014/main" xmlns="" id="{89BB4C68-10AA-462C-88D1-E13850378523}"/>
               </a:ext>
             </a:extLst>
           </p:cNvPr>
@@ -6936,7 +6940,7 @@
           <p:cNvPr id="2" name="TextBox 1">
             <a:extLst>
               <a:ext uri="{FF2B5EF4-FFF2-40B4-BE49-F238E27FC236}">
-                <a16:creationId xmlns:a16="http://schemas.microsoft.com/office/drawing/2014/main" id="{B114A1AF-5F5E-4C0F-A86D-2A75B09AC7FE}"/>
+                <a16:creationId xmlns:a16="http://schemas.microsoft.com/office/drawing/2014/main" xmlns="" id="{B114A1AF-5F5E-4C0F-A86D-2A75B09AC7FE}"/>
               </a:ext>
             </a:extLst>
           </p:cNvPr>
@@ -7416,8 +7420,8 @@
         </p:nvSpPr>
         <p:spPr>
           <a:xfrm>
-            <a:off x="1365196" y="1901949"/>
-            <a:ext cx="3359510" cy="1985165"/>
+            <a:off x="1365195" y="1443835"/>
+            <a:ext cx="2901394" cy="1068936"/>
           </a:xfrm>
           <a:prstGeom prst="rect">
             <a:avLst/>
@@ -7425,7 +7429,7 @@
         </p:spPr>
         <p:txBody>
           <a:bodyPr vert="horz" lIns="91440" tIns="45720" rIns="91440" bIns="45720" rtlCol="0">
-            <a:normAutofit lnSpcReduction="10000"/>
+            <a:normAutofit fontScale="62500" lnSpcReduction="20000"/>
           </a:bodyPr>
           <a:lstStyle>
             <a:lvl1pPr marL="342900" indent="-342900" algn="l" defTabSz="914400" rtl="0" eaLnBrk="1" latinLnBrk="0" hangingPunct="1">
@@ -7591,6 +7595,78 @@
           </a:p>
         </p:txBody>
       </p:sp>
+      <p:pic>
+        <p:nvPicPr>
+          <p:cNvPr id="2" name="Picture 1"/>
+          <p:cNvPicPr>
+            <a:picLocks noChangeAspect="1"/>
+          </p:cNvPicPr>
+          <p:nvPr/>
+        </p:nvPicPr>
+        <p:blipFill>
+          <a:blip r:embed="rId5"/>
+          <a:stretch>
+            <a:fillRect/>
+          </a:stretch>
+        </p:blipFill>
+        <p:spPr>
+          <a:xfrm>
+            <a:off x="1517900" y="2512770"/>
+            <a:ext cx="2787049" cy="1700275"/>
+          </a:xfrm>
+          <a:prstGeom prst="rect">
+            <a:avLst/>
+          </a:prstGeom>
+        </p:spPr>
+      </p:pic>
+      <p:pic>
+        <p:nvPicPr>
+          <p:cNvPr id="5" name="Picture 4"/>
+          <p:cNvPicPr>
+            <a:picLocks noChangeAspect="1"/>
+          </p:cNvPicPr>
+          <p:nvPr/>
+        </p:nvPicPr>
+        <p:blipFill>
+          <a:blip r:embed="rId6"/>
+          <a:stretch>
+            <a:fillRect/>
+          </a:stretch>
+        </p:blipFill>
+        <p:spPr>
+          <a:xfrm>
+            <a:off x="1670605" y="4497935"/>
+            <a:ext cx="2595985" cy="681774"/>
+          </a:xfrm>
+          <a:prstGeom prst="rect">
+            <a:avLst/>
+          </a:prstGeom>
+        </p:spPr>
+      </p:pic>
+      <p:pic>
+        <p:nvPicPr>
+          <p:cNvPr id="6" name="Picture 5"/>
+          <p:cNvPicPr>
+            <a:picLocks noChangeAspect="1"/>
+          </p:cNvPicPr>
+          <p:nvPr/>
+        </p:nvPicPr>
+        <p:blipFill>
+          <a:blip r:embed="rId7"/>
+          <a:stretch>
+            <a:fillRect/>
+          </a:stretch>
+        </p:blipFill>
+        <p:spPr>
+          <a:xfrm>
+            <a:off x="2739540" y="5261460"/>
+            <a:ext cx="1527050" cy="533600"/>
+          </a:xfrm>
+          <a:prstGeom prst="rect">
+            <a:avLst/>
+          </a:prstGeom>
+        </p:spPr>
+      </p:pic>
     </p:spTree>
     <p:extLst>
       <p:ext uri="{BB962C8B-B14F-4D97-AF65-F5344CB8AC3E}">
@@ -7713,7 +7789,7 @@
           <p:cNvPr id="18" name="Content Placeholder 4">
             <a:extLst>
               <a:ext uri="{FF2B5EF4-FFF2-40B4-BE49-F238E27FC236}">
-                <a16:creationId xmlns:a16="http://schemas.microsoft.com/office/drawing/2014/main" id="{DF3DB013-F21F-4775-B99A-2A6E28E35941}"/>
+                <a16:creationId xmlns:a16="http://schemas.microsoft.com/office/drawing/2014/main" xmlns="" id="{DF3DB013-F21F-4775-B99A-2A6E28E35941}"/>
               </a:ext>
             </a:extLst>
           </p:cNvPr>
@@ -8129,7 +8205,7 @@
         </p:spPr>
         <p:txBody>
           <a:bodyPr>
-            <a:normAutofit lnSpcReduction="10000"/>
+            <a:normAutofit/>
           </a:bodyPr>
           <a:lstStyle/>
           <a:p>
@@ -8583,7 +8659,7 @@
           <p:cNvPr id="9" name="Title 8">
             <a:extLst>
               <a:ext uri="{FF2B5EF4-FFF2-40B4-BE49-F238E27FC236}">
-                <a16:creationId xmlns:a16="http://schemas.microsoft.com/office/drawing/2014/main" id="{BCF5E961-1500-4A33-B77A-0C1BCABBB4D9}"/>
+                <a16:creationId xmlns:a16="http://schemas.microsoft.com/office/drawing/2014/main" xmlns="" id="{BCF5E961-1500-4A33-B77A-0C1BCABBB4D9}"/>
               </a:ext>
             </a:extLst>
           </p:cNvPr>
@@ -8617,7 +8693,7 @@
           <p:cNvPr id="10" name="Text Placeholder 9">
             <a:extLst>
               <a:ext uri="{FF2B5EF4-FFF2-40B4-BE49-F238E27FC236}">
-                <a16:creationId xmlns:a16="http://schemas.microsoft.com/office/drawing/2014/main" id="{11EF803C-2E18-4B95-878F-56E259A42045}"/>
+                <a16:creationId xmlns:a16="http://schemas.microsoft.com/office/drawing/2014/main" xmlns="" id="{11EF803C-2E18-4B95-878F-56E259A42045}"/>
               </a:ext>
             </a:extLst>
           </p:cNvPr>
@@ -8710,7 +8786,7 @@
           <p:cNvPr id="6" name="Title 3">
             <a:extLst>
               <a:ext uri="{FF2B5EF4-FFF2-40B4-BE49-F238E27FC236}">
-                <a16:creationId xmlns:a16="http://schemas.microsoft.com/office/drawing/2014/main" id="{9583A6A4-2D21-4507-B328-95C927702653}"/>
+                <a16:creationId xmlns:a16="http://schemas.microsoft.com/office/drawing/2014/main" xmlns="" id="{9583A6A4-2D21-4507-B328-95C927702653}"/>
               </a:ext>
             </a:extLst>
           </p:cNvPr>
@@ -8765,7 +8841,7 @@
           <p:cNvPr id="9" name="Table 8">
             <a:extLst>
               <a:ext uri="{FF2B5EF4-FFF2-40B4-BE49-F238E27FC236}">
-                <a16:creationId xmlns:a16="http://schemas.microsoft.com/office/drawing/2014/main" id="{AA79B504-A602-45A0-BBBB-BAF4AEF19100}"/>
+                <a16:creationId xmlns:a16="http://schemas.microsoft.com/office/drawing/2014/main" xmlns="" id="{AA79B504-A602-45A0-BBBB-BAF4AEF19100}"/>
               </a:ext>
             </a:extLst>
           </p:cNvPr>
@@ -8790,14 +8866,14 @@
                 <a:gridCol w="1246487">
                   <a:extLst>
                     <a:ext uri="{9D8B030D-6E8A-4147-A177-3AD203B41FA5}">
-                      <a16:colId xmlns:a16="http://schemas.microsoft.com/office/drawing/2014/main" val="2465482271"/>
+                      <a16:colId xmlns:a16="http://schemas.microsoft.com/office/drawing/2014/main" xmlns="" val="2465482271"/>
                     </a:ext>
                   </a:extLst>
                 </a:gridCol>
                 <a:gridCol w="1826913">
                   <a:extLst>
                     <a:ext uri="{9D8B030D-6E8A-4147-A177-3AD203B41FA5}">
-                      <a16:colId xmlns:a16="http://schemas.microsoft.com/office/drawing/2014/main" val="459322838"/>
+                      <a16:colId xmlns:a16="http://schemas.microsoft.com/office/drawing/2014/main" xmlns="" val="459322838"/>
                     </a:ext>
                   </a:extLst>
                 </a:gridCol>
@@ -8863,7 +8939,7 @@
                 </a:tc>
                 <a:extLst>
                   <a:ext uri="{0D108BD9-81ED-4DB2-BD59-A6C34878D82A}">
-                    <a16:rowId xmlns:a16="http://schemas.microsoft.com/office/drawing/2014/main" val="2821046416"/>
+                    <a16:rowId xmlns:a16="http://schemas.microsoft.com/office/drawing/2014/main" xmlns="" val="2821046416"/>
                   </a:ext>
                 </a:extLst>
               </a:tr>
@@ -8916,7 +8992,7 @@
                 </a:tc>
                 <a:extLst>
                   <a:ext uri="{0D108BD9-81ED-4DB2-BD59-A6C34878D82A}">
-                    <a16:rowId xmlns:a16="http://schemas.microsoft.com/office/drawing/2014/main" val="259125149"/>
+                    <a16:rowId xmlns:a16="http://schemas.microsoft.com/office/drawing/2014/main" xmlns="" val="259125149"/>
                   </a:ext>
                 </a:extLst>
               </a:tr>
@@ -8969,7 +9045,7 @@
                 </a:tc>
                 <a:extLst>
                   <a:ext uri="{0D108BD9-81ED-4DB2-BD59-A6C34878D82A}">
-                    <a16:rowId xmlns:a16="http://schemas.microsoft.com/office/drawing/2014/main" val="599798767"/>
+                    <a16:rowId xmlns:a16="http://schemas.microsoft.com/office/drawing/2014/main" xmlns="" val="599798767"/>
                   </a:ext>
                 </a:extLst>
               </a:tr>
@@ -8982,7 +9058,7 @@
           <p:cNvPr id="7" name="Table 6">
             <a:extLst>
               <a:ext uri="{FF2B5EF4-FFF2-40B4-BE49-F238E27FC236}">
-                <a16:creationId xmlns:a16="http://schemas.microsoft.com/office/drawing/2014/main" id="{6CC8A5B3-A829-4073-83A7-8DEEB204CB10}"/>
+                <a16:creationId xmlns:a16="http://schemas.microsoft.com/office/drawing/2014/main" xmlns="" id="{6CC8A5B3-A829-4073-83A7-8DEEB204CB10}"/>
               </a:ext>
             </a:extLst>
           </p:cNvPr>
@@ -9011,35 +9087,35 @@
                 <a:gridCol w="953385">
                   <a:extLst>
                     <a:ext uri="{9D8B030D-6E8A-4147-A177-3AD203B41FA5}">
-                      <a16:colId xmlns:a16="http://schemas.microsoft.com/office/drawing/2014/main" val="880838215"/>
+                      <a16:colId xmlns:a16="http://schemas.microsoft.com/office/drawing/2014/main" xmlns="" val="880838215"/>
                     </a:ext>
                   </a:extLst>
                 </a:gridCol>
                 <a:gridCol w="635590">
                   <a:extLst>
                     <a:ext uri="{9D8B030D-6E8A-4147-A177-3AD203B41FA5}">
-                      <a16:colId xmlns:a16="http://schemas.microsoft.com/office/drawing/2014/main" val="2529509929"/>
+                      <a16:colId xmlns:a16="http://schemas.microsoft.com/office/drawing/2014/main" xmlns="" val="2529509929"/>
                     </a:ext>
                   </a:extLst>
                 </a:gridCol>
                 <a:gridCol w="635590">
                   <a:extLst>
                     <a:ext uri="{9D8B030D-6E8A-4147-A177-3AD203B41FA5}">
-                      <a16:colId xmlns:a16="http://schemas.microsoft.com/office/drawing/2014/main" val="895837762"/>
+                      <a16:colId xmlns:a16="http://schemas.microsoft.com/office/drawing/2014/main" xmlns="" val="895837762"/>
                     </a:ext>
                   </a:extLst>
                 </a:gridCol>
                 <a:gridCol w="635590">
                   <a:extLst>
                     <a:ext uri="{9D8B030D-6E8A-4147-A177-3AD203B41FA5}">
-                      <a16:colId xmlns:a16="http://schemas.microsoft.com/office/drawing/2014/main" val="3414946318"/>
+                      <a16:colId xmlns:a16="http://schemas.microsoft.com/office/drawing/2014/main" xmlns="" val="3414946318"/>
                     </a:ext>
                   </a:extLst>
                 </a:gridCol>
                 <a:gridCol w="635590">
                   <a:extLst>
                     <a:ext uri="{9D8B030D-6E8A-4147-A177-3AD203B41FA5}">
-                      <a16:colId xmlns:a16="http://schemas.microsoft.com/office/drawing/2014/main" val="3746756332"/>
+                      <a16:colId xmlns:a16="http://schemas.microsoft.com/office/drawing/2014/main" xmlns="" val="3746756332"/>
                     </a:ext>
                   </a:extLst>
                 </a:gridCol>
@@ -9168,7 +9244,7 @@
                 </a:tc>
                 <a:extLst>
                   <a:ext uri="{0D108BD9-81ED-4DB2-BD59-A6C34878D82A}">
-                    <a16:rowId xmlns:a16="http://schemas.microsoft.com/office/drawing/2014/main" val="1329674258"/>
+                    <a16:rowId xmlns:a16="http://schemas.microsoft.com/office/drawing/2014/main" xmlns="" val="1329674258"/>
                   </a:ext>
                 </a:extLst>
               </a:tr>
@@ -9290,7 +9366,7 @@
                 </a:tc>
                 <a:extLst>
                   <a:ext uri="{0D108BD9-81ED-4DB2-BD59-A6C34878D82A}">
-                    <a16:rowId xmlns:a16="http://schemas.microsoft.com/office/drawing/2014/main" val="4240691640"/>
+                    <a16:rowId xmlns:a16="http://schemas.microsoft.com/office/drawing/2014/main" xmlns="" val="4240691640"/>
                   </a:ext>
                 </a:extLst>
               </a:tr>
@@ -9412,7 +9488,7 @@
                 </a:tc>
                 <a:extLst>
                   <a:ext uri="{0D108BD9-81ED-4DB2-BD59-A6C34878D82A}">
-                    <a16:rowId xmlns:a16="http://schemas.microsoft.com/office/drawing/2014/main" val="1732450860"/>
+                    <a16:rowId xmlns:a16="http://schemas.microsoft.com/office/drawing/2014/main" xmlns="" val="1732450860"/>
                   </a:ext>
                 </a:extLst>
               </a:tr>
@@ -9534,7 +9610,7 @@
                 </a:tc>
                 <a:extLst>
                   <a:ext uri="{0D108BD9-81ED-4DB2-BD59-A6C34878D82A}">
-                    <a16:rowId xmlns:a16="http://schemas.microsoft.com/office/drawing/2014/main" val="3678558747"/>
+                    <a16:rowId xmlns:a16="http://schemas.microsoft.com/office/drawing/2014/main" xmlns="" val="3678558747"/>
                   </a:ext>
                 </a:extLst>
               </a:tr>
@@ -9656,7 +9732,7 @@
                 </a:tc>
                 <a:extLst>
                   <a:ext uri="{0D108BD9-81ED-4DB2-BD59-A6C34878D82A}">
-                    <a16:rowId xmlns:a16="http://schemas.microsoft.com/office/drawing/2014/main" val="2004686189"/>
+                    <a16:rowId xmlns:a16="http://schemas.microsoft.com/office/drawing/2014/main" xmlns="" val="2004686189"/>
                   </a:ext>
                 </a:extLst>
               </a:tr>
@@ -9778,7 +9854,7 @@
                 </a:tc>
                 <a:extLst>
                   <a:ext uri="{0D108BD9-81ED-4DB2-BD59-A6C34878D82A}">
-                    <a16:rowId xmlns:a16="http://schemas.microsoft.com/office/drawing/2014/main" val="279164385"/>
+                    <a16:rowId xmlns:a16="http://schemas.microsoft.com/office/drawing/2014/main" xmlns="" val="279164385"/>
                   </a:ext>
                 </a:extLst>
               </a:tr>
@@ -9900,7 +9976,7 @@
                 </a:tc>
                 <a:extLst>
                   <a:ext uri="{0D108BD9-81ED-4DB2-BD59-A6C34878D82A}">
-                    <a16:rowId xmlns:a16="http://schemas.microsoft.com/office/drawing/2014/main" val="487630636"/>
+                    <a16:rowId xmlns:a16="http://schemas.microsoft.com/office/drawing/2014/main" xmlns="" val="487630636"/>
                   </a:ext>
                 </a:extLst>
               </a:tr>
@@ -10022,7 +10098,7 @@
                 </a:tc>
                 <a:extLst>
                   <a:ext uri="{0D108BD9-81ED-4DB2-BD59-A6C34878D82A}">
-                    <a16:rowId xmlns:a16="http://schemas.microsoft.com/office/drawing/2014/main" val="3565446120"/>
+                    <a16:rowId xmlns:a16="http://schemas.microsoft.com/office/drawing/2014/main" xmlns="" val="3565446120"/>
                   </a:ext>
                 </a:extLst>
               </a:tr>
@@ -10144,7 +10220,7 @@
                 </a:tc>
                 <a:extLst>
                   <a:ext uri="{0D108BD9-81ED-4DB2-BD59-A6C34878D82A}">
-                    <a16:rowId xmlns:a16="http://schemas.microsoft.com/office/drawing/2014/main" val="352114911"/>
+                    <a16:rowId xmlns:a16="http://schemas.microsoft.com/office/drawing/2014/main" xmlns="" val="352114911"/>
                   </a:ext>
                 </a:extLst>
               </a:tr>
@@ -10266,7 +10342,7 @@
                 </a:tc>
                 <a:extLst>
                   <a:ext uri="{0D108BD9-81ED-4DB2-BD59-A6C34878D82A}">
-                    <a16:rowId xmlns:a16="http://schemas.microsoft.com/office/drawing/2014/main" val="386690825"/>
+                    <a16:rowId xmlns:a16="http://schemas.microsoft.com/office/drawing/2014/main" xmlns="" val="386690825"/>
                   </a:ext>
                 </a:extLst>
               </a:tr>
@@ -10388,7 +10464,7 @@
                 </a:tc>
                 <a:extLst>
                   <a:ext uri="{0D108BD9-81ED-4DB2-BD59-A6C34878D82A}">
-                    <a16:rowId xmlns:a16="http://schemas.microsoft.com/office/drawing/2014/main" val="1000163892"/>
+                    <a16:rowId xmlns:a16="http://schemas.microsoft.com/office/drawing/2014/main" xmlns="" val="1000163892"/>
                   </a:ext>
                 </a:extLst>
               </a:tr>
@@ -10510,7 +10586,7 @@
                 </a:tc>
                 <a:extLst>
                   <a:ext uri="{0D108BD9-81ED-4DB2-BD59-A6C34878D82A}">
-                    <a16:rowId xmlns:a16="http://schemas.microsoft.com/office/drawing/2014/main" val="3113454548"/>
+                    <a16:rowId xmlns:a16="http://schemas.microsoft.com/office/drawing/2014/main" xmlns="" val="3113454548"/>
                   </a:ext>
                 </a:extLst>
               </a:tr>
@@ -10632,7 +10708,7 @@
                 </a:tc>
                 <a:extLst>
                   <a:ext uri="{0D108BD9-81ED-4DB2-BD59-A6C34878D82A}">
-                    <a16:rowId xmlns:a16="http://schemas.microsoft.com/office/drawing/2014/main" val="3103038098"/>
+                    <a16:rowId xmlns:a16="http://schemas.microsoft.com/office/drawing/2014/main" xmlns="" val="3103038098"/>
                   </a:ext>
                 </a:extLst>
               </a:tr>
@@ -10754,7 +10830,7 @@
                 </a:tc>
                 <a:extLst>
                   <a:ext uri="{0D108BD9-81ED-4DB2-BD59-A6C34878D82A}">
-                    <a16:rowId xmlns:a16="http://schemas.microsoft.com/office/drawing/2014/main" val="1068511064"/>
+                    <a16:rowId xmlns:a16="http://schemas.microsoft.com/office/drawing/2014/main" xmlns="" val="1068511064"/>
                   </a:ext>
                 </a:extLst>
               </a:tr>
@@ -10876,7 +10952,7 @@
                 </a:tc>
                 <a:extLst>
                   <a:ext uri="{0D108BD9-81ED-4DB2-BD59-A6C34878D82A}">
-                    <a16:rowId xmlns:a16="http://schemas.microsoft.com/office/drawing/2014/main" val="347837285"/>
+                    <a16:rowId xmlns:a16="http://schemas.microsoft.com/office/drawing/2014/main" xmlns="" val="347837285"/>
                   </a:ext>
                 </a:extLst>
               </a:tr>
@@ -10998,7 +11074,7 @@
                 </a:tc>
                 <a:extLst>
                   <a:ext uri="{0D108BD9-81ED-4DB2-BD59-A6C34878D82A}">
-                    <a16:rowId xmlns:a16="http://schemas.microsoft.com/office/drawing/2014/main" val="1551749157"/>
+                    <a16:rowId xmlns:a16="http://schemas.microsoft.com/office/drawing/2014/main" xmlns="" val="1551749157"/>
                   </a:ext>
                 </a:extLst>
               </a:tr>
@@ -11120,7 +11196,7 @@
                 </a:tc>
                 <a:extLst>
                   <a:ext uri="{0D108BD9-81ED-4DB2-BD59-A6C34878D82A}">
-                    <a16:rowId xmlns:a16="http://schemas.microsoft.com/office/drawing/2014/main" val="1221700048"/>
+                    <a16:rowId xmlns:a16="http://schemas.microsoft.com/office/drawing/2014/main" xmlns="" val="1221700048"/>
                   </a:ext>
                 </a:extLst>
               </a:tr>
@@ -11242,7 +11318,7 @@
                 </a:tc>
                 <a:extLst>
                   <a:ext uri="{0D108BD9-81ED-4DB2-BD59-A6C34878D82A}">
-                    <a16:rowId xmlns:a16="http://schemas.microsoft.com/office/drawing/2014/main" val="992461386"/>
+                    <a16:rowId xmlns:a16="http://schemas.microsoft.com/office/drawing/2014/main" xmlns="" val="992461386"/>
                   </a:ext>
                 </a:extLst>
               </a:tr>
@@ -11364,7 +11440,7 @@
                 </a:tc>
                 <a:extLst>
                   <a:ext uri="{0D108BD9-81ED-4DB2-BD59-A6C34878D82A}">
-                    <a16:rowId xmlns:a16="http://schemas.microsoft.com/office/drawing/2014/main" val="2240546293"/>
+                    <a16:rowId xmlns:a16="http://schemas.microsoft.com/office/drawing/2014/main" xmlns="" val="2240546293"/>
                   </a:ext>
                 </a:extLst>
               </a:tr>
@@ -11486,7 +11562,7 @@
                 </a:tc>
                 <a:extLst>
                   <a:ext uri="{0D108BD9-81ED-4DB2-BD59-A6C34878D82A}">
-                    <a16:rowId xmlns:a16="http://schemas.microsoft.com/office/drawing/2014/main" val="1881982183"/>
+                    <a16:rowId xmlns:a16="http://schemas.microsoft.com/office/drawing/2014/main" xmlns="" val="1881982183"/>
                   </a:ext>
                 </a:extLst>
               </a:tr>
@@ -11608,7 +11684,7 @@
                 </a:tc>
                 <a:extLst>
                   <a:ext uri="{0D108BD9-81ED-4DB2-BD59-A6C34878D82A}">
-                    <a16:rowId xmlns:a16="http://schemas.microsoft.com/office/drawing/2014/main" val="3506898974"/>
+                    <a16:rowId xmlns:a16="http://schemas.microsoft.com/office/drawing/2014/main" xmlns="" val="3506898974"/>
                   </a:ext>
                 </a:extLst>
               </a:tr>
@@ -11730,7 +11806,7 @@
                 </a:tc>
                 <a:extLst>
                   <a:ext uri="{0D108BD9-81ED-4DB2-BD59-A6C34878D82A}">
-                    <a16:rowId xmlns:a16="http://schemas.microsoft.com/office/drawing/2014/main" val="503462108"/>
+                    <a16:rowId xmlns:a16="http://schemas.microsoft.com/office/drawing/2014/main" xmlns="" val="503462108"/>
                   </a:ext>
                 </a:extLst>
               </a:tr>
@@ -11852,7 +11928,7 @@
                 </a:tc>
                 <a:extLst>
                   <a:ext uri="{0D108BD9-81ED-4DB2-BD59-A6C34878D82A}">
-                    <a16:rowId xmlns:a16="http://schemas.microsoft.com/office/drawing/2014/main" val="3289877154"/>
+                    <a16:rowId xmlns:a16="http://schemas.microsoft.com/office/drawing/2014/main" xmlns="" val="3289877154"/>
                   </a:ext>
                 </a:extLst>
               </a:tr>
@@ -11974,7 +12050,7 @@
                 </a:tc>
                 <a:extLst>
                   <a:ext uri="{0D108BD9-81ED-4DB2-BD59-A6C34878D82A}">
-                    <a16:rowId xmlns:a16="http://schemas.microsoft.com/office/drawing/2014/main" val="1837071868"/>
+                    <a16:rowId xmlns:a16="http://schemas.microsoft.com/office/drawing/2014/main" xmlns="" val="1837071868"/>
                   </a:ext>
                 </a:extLst>
               </a:tr>
@@ -12017,7 +12093,7 @@
           <p:cNvPr id="8" name="Picture 8" descr="A close up of a logo&#10;&#10;Description generated with high confidence">
             <a:extLst>
               <a:ext uri="{FF2B5EF4-FFF2-40B4-BE49-F238E27FC236}">
-                <a16:creationId xmlns:a16="http://schemas.microsoft.com/office/drawing/2014/main" id="{1FDADF91-0F72-4800-96BE-94BA90290CBA}"/>
+                <a16:creationId xmlns:a16="http://schemas.microsoft.com/office/drawing/2014/main" xmlns="" id="{1FDADF91-0F72-4800-96BE-94BA90290CBA}"/>
               </a:ext>
             </a:extLst>
           </p:cNvPr>
@@ -12049,7 +12125,7 @@
           <p:cNvPr id="12" name="TextBox 11">
             <a:extLst>
               <a:ext uri="{FF2B5EF4-FFF2-40B4-BE49-F238E27FC236}">
-                <a16:creationId xmlns:a16="http://schemas.microsoft.com/office/drawing/2014/main" id="{442F14DA-96A7-49B4-BA6F-4D49AEFD60D5}"/>
+                <a16:creationId xmlns:a16="http://schemas.microsoft.com/office/drawing/2014/main" xmlns="" id="{442F14DA-96A7-49B4-BA6F-4D49AEFD60D5}"/>
               </a:ext>
             </a:extLst>
           </p:cNvPr>
@@ -12089,7 +12165,7 @@
           <p:cNvPr id="2" name="TextBox 1">
             <a:extLst>
               <a:ext uri="{FF2B5EF4-FFF2-40B4-BE49-F238E27FC236}">
-                <a16:creationId xmlns:a16="http://schemas.microsoft.com/office/drawing/2014/main" id="{7369C0BA-886B-41DF-BE53-C32D963020EA}"/>
+                <a16:creationId xmlns:a16="http://schemas.microsoft.com/office/drawing/2014/main" xmlns="" id="{7369C0BA-886B-41DF-BE53-C32D963020EA}"/>
               </a:ext>
             </a:extLst>
           </p:cNvPr>
@@ -12439,7 +12515,7 @@
           <p:cNvPr id="4" name="TextBox 3">
             <a:extLst>
               <a:ext uri="{FF2B5EF4-FFF2-40B4-BE49-F238E27FC236}">
-                <a16:creationId xmlns:a16="http://schemas.microsoft.com/office/drawing/2014/main" id="{25643C26-B664-4441-8FFA-6E923C378C68}"/>
+                <a16:creationId xmlns:a16="http://schemas.microsoft.com/office/drawing/2014/main" xmlns="" id="{25643C26-B664-4441-8FFA-6E923C378C68}"/>
               </a:ext>
             </a:extLst>
           </p:cNvPr>
@@ -12508,7 +12584,7 @@
           <p:cNvPr id="2" name="Picture 2" descr="A close up of text on a black background&#10;&#10;Description generated with high confidence">
             <a:extLst>
               <a:ext uri="{FF2B5EF4-FFF2-40B4-BE49-F238E27FC236}">
-                <a16:creationId xmlns:a16="http://schemas.microsoft.com/office/drawing/2014/main" id="{8D16B65E-B7B9-4B27-97C4-85C52748C5C4}"/>
+                <a16:creationId xmlns:a16="http://schemas.microsoft.com/office/drawing/2014/main" xmlns="" id="{8D16B65E-B7B9-4B27-97C4-85C52748C5C4}"/>
               </a:ext>
             </a:extLst>
           </p:cNvPr>
@@ -13337,7 +13413,7 @@
           <p:cNvPr id="2" name="Picture 2" descr="A close up of text on a white background&#10;&#10;Description generated with high confidence">
             <a:extLst>
               <a:ext uri="{FF2B5EF4-FFF2-40B4-BE49-F238E27FC236}">
-                <a16:creationId xmlns:a16="http://schemas.microsoft.com/office/drawing/2014/main" id="{19436EB7-EF2B-4C72-84A6-87E60CC3D502}"/>
+                <a16:creationId xmlns:a16="http://schemas.microsoft.com/office/drawing/2014/main" xmlns="" id="{19436EB7-EF2B-4C72-84A6-87E60CC3D502}"/>
               </a:ext>
             </a:extLst>
           </p:cNvPr>
@@ -13367,7 +13443,7 @@
           <p:cNvPr id="3" name="TextBox 2">
             <a:extLst>
               <a:ext uri="{FF2B5EF4-FFF2-40B4-BE49-F238E27FC236}">
-                <a16:creationId xmlns:a16="http://schemas.microsoft.com/office/drawing/2014/main" id="{88A4D58E-77C7-4954-9FE1-FEFB02FD25EF}"/>
+                <a16:creationId xmlns:a16="http://schemas.microsoft.com/office/drawing/2014/main" xmlns="" id="{88A4D58E-77C7-4954-9FE1-FEFB02FD25EF}"/>
               </a:ext>
             </a:extLst>
           </p:cNvPr>
@@ -13406,7 +13482,7 @@
           <p:cNvPr id="4" name="TextBox 3">
             <a:extLst>
               <a:ext uri="{FF2B5EF4-FFF2-40B4-BE49-F238E27FC236}">
-                <a16:creationId xmlns:a16="http://schemas.microsoft.com/office/drawing/2014/main" id="{5A13CDDF-02C2-4ACC-8EE9-698E455696C0}"/>
+                <a16:creationId xmlns:a16="http://schemas.microsoft.com/office/drawing/2014/main" xmlns="" id="{5A13CDDF-02C2-4ACC-8EE9-698E455696C0}"/>
               </a:ext>
             </a:extLst>
           </p:cNvPr>
@@ -14214,7 +14290,7 @@
   <a:extraClrSchemeLst/>
   <a:extLst>
     <a:ext uri="{05A4C25C-085E-4340-85A3-A5531E510DB2}">
-      <thm15:themeFamily xmlns:thm15="http://schemas.microsoft.com/office/thememl/2012/main" name="Office Theme" id="{62F939B6-93AF-4DB8-9C6B-D6C7DFDC589F}" vid="{4A3C46E8-61CC-4603-A589-7422A47A8E4A}"/>
+      <thm15:themeFamily xmlns:thm15="http://schemas.microsoft.com/office/thememl/2012/main" xmlns="" name="Office Theme" id="{62F939B6-93AF-4DB8-9C6B-D6C7DFDC589F}" vid="{4A3C46E8-61CC-4603-A589-7422A47A8E4A}"/>
     </a:ext>
   </a:extLst>
 </a:theme>

</xml_diff>